<commit_message>
updates on Pink Floyd
</commit_message>
<xml_diff>
--- a/HSTR121/ppts/Early1970sGoodBadUgly.pptx
+++ b/HSTR121/ppts/Early1970sGoodBadUgly.pptx
@@ -214,7 +214,7 @@
           <a:p>
             <a:fld id="{56275479-FADF-41D7-8573-0C393984AE94}" type="datetimeFigureOut">
               <a:rPr lang="en-US" smtClean="0"/>
-              <a:t>3/5/18</a:t>
+              <a:t>3/8/18</a:t>
             </a:fld>
             <a:endParaRPr lang="en-US"/>
           </a:p>
@@ -909,7 +909,7 @@
             <a:fld id="{87DE6118-2437-4B30-8E3C-4D2BE6020583}" type="datetimeFigureOut">
               <a:rPr lang="en-US" dirty="0"/>
               <a:pPr/>
-              <a:t>3/5/18</a:t>
+              <a:t>3/8/18</a:t>
             </a:fld>
             <a:endParaRPr lang="en-US" dirty="0"/>
           </a:p>
@@ -1235,7 +1235,7 @@
           <a:p>
             <a:fld id="{87DE6118-2437-4B30-8E3C-4D2BE6020583}" type="datetimeFigureOut">
               <a:rPr lang="en-US" dirty="0"/>
-              <a:t>3/5/18</a:t>
+              <a:t>3/8/18</a:t>
             </a:fld>
             <a:endParaRPr lang="en-US" dirty="0"/>
           </a:p>
@@ -1410,7 +1410,7 @@
           <a:p>
             <a:fld id="{87DE6118-2437-4B30-8E3C-4D2BE6020583}" type="datetimeFigureOut">
               <a:rPr lang="en-US" dirty="0"/>
-              <a:t>3/5/18</a:t>
+              <a:t>3/8/18</a:t>
             </a:fld>
             <a:endParaRPr lang="en-US" dirty="0"/>
           </a:p>
@@ -1575,7 +1575,7 @@
           <a:p>
             <a:fld id="{87DE6118-2437-4B30-8E3C-4D2BE6020583}" type="datetimeFigureOut">
               <a:rPr lang="en-US" dirty="0"/>
-              <a:t>3/5/18</a:t>
+              <a:t>3/8/18</a:t>
             </a:fld>
             <a:endParaRPr lang="en-US" dirty="0"/>
           </a:p>
@@ -1848,7 +1848,7 @@
             <a:fld id="{87DE6118-2437-4B30-8E3C-4D2BE6020583}" type="datetimeFigureOut">
               <a:rPr lang="en-US" dirty="0"/>
               <a:pPr/>
-              <a:t>3/5/18</a:t>
+              <a:t>3/8/18</a:t>
             </a:fld>
             <a:endParaRPr lang="en-US" dirty="0"/>
           </a:p>
@@ -2238,7 +2238,7 @@
           <a:p>
             <a:fld id="{87DE6118-2437-4B30-8E3C-4D2BE6020583}" type="datetimeFigureOut">
               <a:rPr lang="en-US" dirty="0"/>
-              <a:t>3/5/18</a:t>
+              <a:t>3/8/18</a:t>
             </a:fld>
             <a:endParaRPr lang="en-US" dirty="0"/>
           </a:p>
@@ -2710,7 +2710,7 @@
           <a:p>
             <a:fld id="{87DE6118-2437-4B30-8E3C-4D2BE6020583}" type="datetimeFigureOut">
               <a:rPr lang="en-US" dirty="0"/>
-              <a:t>3/5/18</a:t>
+              <a:t>3/8/18</a:t>
             </a:fld>
             <a:endParaRPr lang="en-US" dirty="0"/>
           </a:p>
@@ -2823,7 +2823,7 @@
           <a:p>
             <a:fld id="{87DE6118-2437-4B30-8E3C-4D2BE6020583}" type="datetimeFigureOut">
               <a:rPr lang="en-US" dirty="0"/>
-              <a:t>3/5/18</a:t>
+              <a:t>3/8/18</a:t>
             </a:fld>
             <a:endParaRPr lang="en-US" dirty="0"/>
           </a:p>
@@ -2913,7 +2913,7 @@
           <a:p>
             <a:fld id="{87DE6118-2437-4B30-8E3C-4D2BE6020583}" type="datetimeFigureOut">
               <a:rPr lang="en-US" dirty="0"/>
-              <a:t>3/5/18</a:t>
+              <a:t>3/8/18</a:t>
             </a:fld>
             <a:endParaRPr lang="en-US" dirty="0"/>
           </a:p>
@@ -3255,7 +3255,7 @@
             <a:fld id="{87DE6118-2437-4B30-8E3C-4D2BE6020583}" type="datetimeFigureOut">
               <a:rPr lang="en-US" dirty="0"/>
               <a:pPr/>
-              <a:t>3/5/18</a:t>
+              <a:t>3/8/18</a:t>
             </a:fld>
             <a:endParaRPr lang="en-US" dirty="0"/>
           </a:p>
@@ -3640,7 +3640,7 @@
             <a:fld id="{87DE6118-2437-4B30-8E3C-4D2BE6020583}" type="datetimeFigureOut">
               <a:rPr lang="en-US" dirty="0"/>
               <a:pPr/>
-              <a:t>3/5/18</a:t>
+              <a:t>3/8/18</a:t>
             </a:fld>
             <a:endParaRPr lang="en-US" dirty="0"/>
           </a:p>
@@ -3915,7 +3915,7 @@
             <a:fld id="{87DE6118-2437-4B30-8E3C-4D2BE6020583}" type="datetimeFigureOut">
               <a:rPr lang="en-US" dirty="0"/>
               <a:pPr/>
-              <a:t>3/5/18</a:t>
+              <a:t>3/8/18</a:t>
             </a:fld>
             <a:endParaRPr lang="en-US" dirty="0"/>
           </a:p>
@@ -5237,14 +5237,25 @@
             <p:ph type="title"/>
           </p:nvPr>
         </p:nvSpPr>
-        <p:spPr/>
+        <p:spPr>
+          <a:xfrm>
+            <a:off x="1371600" y="685800"/>
+            <a:ext cx="9601200" cy="886146"/>
+          </a:xfrm>
+        </p:spPr>
         <p:txBody>
-          <a:bodyPr/>
+          <a:bodyPr>
+            <a:normAutofit fontScale="90000"/>
+          </a:bodyPr>
           <a:lstStyle/>
           <a:p>
             <a:r>
+              <a:rPr lang="en-US" sz="6000" dirty="0"/>
+              <a:t>Heart</a:t>
+            </a:r>
+            <a:r>
               <a:rPr lang="en-US" dirty="0"/>
-              <a:t>Heart, Anne and Nancy Wilson</a:t>
+              <a:t>, Anne and Nancy Wilson</a:t>
             </a:r>
           </a:p>
         </p:txBody>

</xml_diff>

<commit_message>
added photo of Heart
</commit_message>
<xml_diff>
--- a/HSTR121/ppts/Early1970sGoodBadUgly.pptx
+++ b/HSTR121/ppts/Early1970sGoodBadUgly.pptx
@@ -5,7 +5,7 @@
     <p:sldMasterId id="2147483648" r:id="rId1"/>
   </p:sldMasterIdLst>
   <p:notesMasterIdLst>
-    <p:notesMasterId r:id="rId20"/>
+    <p:notesMasterId r:id="rId21"/>
   </p:notesMasterIdLst>
   <p:sldIdLst>
     <p:sldId id="256" r:id="rId2"/>
@@ -22,10 +22,11 @@
     <p:sldId id="264" r:id="rId13"/>
     <p:sldId id="265" r:id="rId14"/>
     <p:sldId id="266" r:id="rId15"/>
-    <p:sldId id="267" r:id="rId16"/>
-    <p:sldId id="268" r:id="rId17"/>
-    <p:sldId id="269" r:id="rId18"/>
-    <p:sldId id="270" r:id="rId19"/>
+    <p:sldId id="274" r:id="rId16"/>
+    <p:sldId id="267" r:id="rId17"/>
+    <p:sldId id="268" r:id="rId18"/>
+    <p:sldId id="269" r:id="rId19"/>
+    <p:sldId id="270" r:id="rId20"/>
   </p:sldIdLst>
   <p:sldSz cx="12192000" cy="6858000"/>
   <p:notesSz cx="6858000" cy="9144000"/>
@@ -549,7 +550,7 @@
           <a:p>
             <a:fld id="{4650ECFB-5DB9-4830-AE31-9E69EEFBEC8B}" type="slidenum">
               <a:rPr lang="en-US" smtClean="0"/>
-              <a:t>16</a:t>
+              <a:t>17</a:t>
             </a:fld>
             <a:endParaRPr lang="en-US"/>
           </a:p>
@@ -633,7 +634,7 @@
           <a:p>
             <a:fld id="{4650ECFB-5DB9-4830-AE31-9E69EEFBEC8B}" type="slidenum">
               <a:rPr lang="en-US" smtClean="0"/>
-              <a:t>17</a:t>
+              <a:t>18</a:t>
             </a:fld>
             <a:endParaRPr lang="en-US"/>
           </a:p>
@@ -720,7 +721,7 @@
           <a:p>
             <a:fld id="{4650ECFB-5DB9-4830-AE31-9E69EEFBEC8B}" type="slidenum">
               <a:rPr lang="en-US" smtClean="0"/>
-              <a:t>18</a:t>
+              <a:t>19</a:t>
             </a:fld>
             <a:endParaRPr lang="en-US"/>
           </a:p>
@@ -5421,6 +5422,287 @@
 <file path=ppt/slides/slide15.xml><?xml version="1.0" encoding="utf-8"?>
 <p:sld xmlns:a="http://schemas.openxmlformats.org/drawingml/2006/main" xmlns:r="http://schemas.openxmlformats.org/officeDocument/2006/relationships" xmlns:p="http://schemas.openxmlformats.org/presentationml/2006/main">
   <p:cSld>
+    <p:bg>
+      <p:bgPr>
+        <a:solidFill>
+          <a:schemeClr val="bg2"/>
+        </a:solidFill>
+        <a:effectLst/>
+      </p:bgPr>
+    </p:bg>
+    <p:spTree>
+      <p:nvGrpSpPr>
+        <p:cNvPr id="1" name=""/>
+        <p:cNvGrpSpPr/>
+        <p:nvPr/>
+      </p:nvGrpSpPr>
+      <p:grpSpPr>
+        <a:xfrm>
+          <a:off x="0" y="0"/>
+          <a:ext cx="0" cy="0"/>
+          <a:chOff x="0" y="0"/>
+          <a:chExt cx="0" cy="0"/>
+        </a:xfrm>
+      </p:grpSpPr>
+      <p:sp useBgFill="1">
+        <p:nvSpPr>
+          <p:cNvPr id="17" name="Rectangle 16">
+            <a:extLst>
+              <a:ext uri="{FF2B5EF4-FFF2-40B4-BE49-F238E27FC236}">
+                <a16:creationId xmlns:a16="http://schemas.microsoft.com/office/drawing/2014/main" id="{1D868099-6145-4BC0-A5EA-74BEF1776BA9}"/>
+              </a:ext>
+            </a:extLst>
+          </p:cNvPr>
+          <p:cNvSpPr>
+            <a:spLocks noGrp="1" noRot="1" noChangeAspect="1" noMove="1" noResize="1" noEditPoints="1" noAdjustHandles="1" noChangeArrowheads="1" noChangeShapeType="1" noTextEdit="1"/>
+          </p:cNvSpPr>
+          <p:nvPr>
+            <p:extLst>
+              <p:ext uri="{386F3935-93C4-4BCD-93E2-E3B085C9AB24}">
+                <p16:designElem xmlns:p16="http://schemas.microsoft.com/office/powerpoint/2015/main" val="1"/>
+              </p:ext>
+            </p:extLst>
+          </p:nvPr>
+        </p:nvSpPr>
+        <p:spPr>
+          <a:xfrm>
+            <a:off x="0" y="0"/>
+            <a:ext cx="12192000" cy="6858000"/>
+          </a:xfrm>
+          <a:prstGeom prst="rect">
+            <a:avLst/>
+          </a:prstGeom>
+          <a:ln>
+            <a:noFill/>
+          </a:ln>
+        </p:spPr>
+        <p:style>
+          <a:lnRef idx="2">
+            <a:schemeClr val="accent1">
+              <a:shade val="50000"/>
+            </a:schemeClr>
+          </a:lnRef>
+          <a:fillRef idx="1">
+            <a:schemeClr val="accent1"/>
+          </a:fillRef>
+          <a:effectRef idx="0">
+            <a:schemeClr val="accent1"/>
+          </a:effectRef>
+          <a:fontRef idx="minor">
+            <a:schemeClr val="lt1"/>
+          </a:fontRef>
+        </p:style>
+        <p:txBody>
+          <a:bodyPr rtlCol="0" anchor="ctr"/>
+          <a:lstStyle/>
+          <a:p>
+            <a:pPr algn="ctr"/>
+            <a:endParaRPr lang="en-US"/>
+          </a:p>
+        </p:txBody>
+      </p:sp>
+      <p:pic>
+        <p:nvPicPr>
+          <p:cNvPr id="12" name="Content Placeholder 8">
+            <a:extLst>
+              <a:ext uri="{FF2B5EF4-FFF2-40B4-BE49-F238E27FC236}">
+                <a16:creationId xmlns:a16="http://schemas.microsoft.com/office/drawing/2014/main" id="{7669F8ED-7C05-5747-840D-F60EC2B2075D}"/>
+              </a:ext>
+            </a:extLst>
+          </p:cNvPr>
+          <p:cNvPicPr>
+            <a:picLocks noChangeAspect="1"/>
+          </p:cNvPicPr>
+          <p:nvPr/>
+        </p:nvPicPr>
+        <p:blipFill>
+          <a:blip r:embed="rId2"/>
+          <a:stretch>
+            <a:fillRect/>
+          </a:stretch>
+        </p:blipFill>
+        <p:spPr>
+          <a:xfrm>
+            <a:off x="634275" y="1488268"/>
+            <a:ext cx="6900380" cy="3881463"/>
+          </a:xfrm>
+          <a:prstGeom prst="rect">
+            <a:avLst/>
+          </a:prstGeom>
+        </p:spPr>
+      </p:pic>
+      <p:sp>
+        <p:nvSpPr>
+          <p:cNvPr id="19" name="Freeform 6">
+            <a:extLst>
+              <a:ext uri="{FF2B5EF4-FFF2-40B4-BE49-F238E27FC236}">
+                <a16:creationId xmlns:a16="http://schemas.microsoft.com/office/drawing/2014/main" id="{CC1026F7-DECB-49B4-A565-518BBA445471}"/>
+              </a:ext>
+            </a:extLst>
+          </p:cNvPr>
+          <p:cNvSpPr>
+            <a:spLocks noGrp="1" noRot="1" noChangeAspect="1" noMove="1" noResize="1" noEditPoints="1" noAdjustHandles="1" noChangeArrowheads="1" noChangeShapeType="1" noTextEdit="1"/>
+          </p:cNvSpPr>
+          <p:nvPr>
+            <p:extLst>
+              <p:ext uri="{386F3935-93C4-4BCD-93E2-E3B085C9AB24}">
+                <p16:designElem xmlns:p16="http://schemas.microsoft.com/office/powerpoint/2015/main" val="1"/>
+              </p:ext>
+            </p:extLst>
+          </p:nvPr>
+        </p:nvSpPr>
+        <p:spPr bwMode="auto">
+          <a:xfrm flipH="1" flipV="1">
+            <a:off x="7983434" y="640080"/>
+            <a:ext cx="2296028" cy="3674981"/>
+          </a:xfrm>
+          <a:custGeom>
+            <a:avLst/>
+            <a:gdLst/>
+            <a:ahLst/>
+            <a:cxnLst/>
+            <a:rect l="l" t="t" r="r" b="b"/>
+            <a:pathLst>
+              <a:path w="10002" h="10000">
+                <a:moveTo>
+                  <a:pt x="8763" y="0"/>
+                </a:moveTo>
+                <a:lnTo>
+                  <a:pt x="10002" y="0"/>
+                </a:lnTo>
+                <a:lnTo>
+                  <a:pt x="10002" y="10000"/>
+                </a:lnTo>
+                <a:lnTo>
+                  <a:pt x="2" y="10000"/>
+                </a:lnTo>
+                <a:cubicBezTo>
+                  <a:pt x="-2" y="9698"/>
+                  <a:pt x="4" y="9427"/>
+                  <a:pt x="0" y="9125"/>
+                </a:cubicBezTo>
+                <a:lnTo>
+                  <a:pt x="8763" y="9128"/>
+                </a:lnTo>
+                <a:lnTo>
+                  <a:pt x="8763" y="0"/>
+                </a:lnTo>
+                <a:close/>
+              </a:path>
+            </a:pathLst>
+          </a:custGeom>
+          <a:solidFill>
+            <a:schemeClr val="tx2"/>
+          </a:solidFill>
+          <a:ln w="0">
+            <a:noFill/>
+            <a:prstDash val="solid"/>
+            <a:round/>
+            <a:headEnd/>
+            <a:tailEnd/>
+          </a:ln>
+        </p:spPr>
+      </p:sp>
+      <p:sp>
+        <p:nvSpPr>
+          <p:cNvPr id="2" name="Title 1">
+            <a:extLst>
+              <a:ext uri="{FF2B5EF4-FFF2-40B4-BE49-F238E27FC236}">
+                <a16:creationId xmlns:a16="http://schemas.microsoft.com/office/drawing/2014/main" id="{5AFF6252-FE8F-3F4E-95AD-26BA2CD32496}"/>
+              </a:ext>
+            </a:extLst>
+          </p:cNvPr>
+          <p:cNvSpPr>
+            <a:spLocks noGrp="1"/>
+          </p:cNvSpPr>
+          <p:nvPr>
+            <p:ph type="title"/>
+          </p:nvPr>
+        </p:nvSpPr>
+        <p:spPr>
+          <a:xfrm>
+            <a:off x="8471424" y="1110882"/>
+            <a:ext cx="3053039" cy="1060817"/>
+          </a:xfrm>
+        </p:spPr>
+        <p:txBody>
+          <a:bodyPr anchor="b">
+            <a:normAutofit/>
+          </a:bodyPr>
+          <a:lstStyle/>
+          <a:p>
+            <a:r>
+              <a:rPr lang="en-US" sz="2800"/>
+              <a:t>Heart, 1977</a:t>
+            </a:r>
+          </a:p>
+        </p:txBody>
+      </p:sp>
+      <p:sp>
+        <p:nvSpPr>
+          <p:cNvPr id="14" name="Content Placeholder 13">
+            <a:extLst>
+              <a:ext uri="{FF2B5EF4-FFF2-40B4-BE49-F238E27FC236}">
+                <a16:creationId xmlns:a16="http://schemas.microsoft.com/office/drawing/2014/main" id="{0813A0FC-89CC-418E-BEE4-502481ACB47D}"/>
+              </a:ext>
+            </a:extLst>
+          </p:cNvPr>
+          <p:cNvSpPr>
+            <a:spLocks noGrp="1"/>
+          </p:cNvSpPr>
+          <p:nvPr>
+            <p:ph idx="1"/>
+          </p:nvPr>
+        </p:nvSpPr>
+        <p:spPr>
+          <a:xfrm>
+            <a:off x="8471423" y="2286000"/>
+            <a:ext cx="3053039" cy="3931920"/>
+          </a:xfrm>
+        </p:spPr>
+        <p:txBody>
+          <a:bodyPr>
+            <a:normAutofit/>
+          </a:bodyPr>
+          <a:lstStyle/>
+          <a:p>
+            <a:r>
+              <a:rPr lang="en-US" sz="1600" dirty="0"/>
+              <a:t>Rolling Stone article: </a:t>
+            </a:r>
+          </a:p>
+          <a:p>
+            <a:r>
+              <a:rPr lang="en-US" sz="1600" dirty="0"/>
+              <a:t>https://</a:t>
+            </a:r>
+            <a:r>
+              <a:rPr lang="en-US" sz="1600" dirty="0" err="1"/>
+              <a:t>www.rollingstone.com</a:t>
+            </a:r>
+            <a:r>
+              <a:rPr lang="en-US" sz="1600" dirty="0"/>
+              <a:t>/music/features/the-wilson-sisters-talk-heart-to-heart-19770728</a:t>
+            </a:r>
+          </a:p>
+        </p:txBody>
+      </p:sp>
+    </p:spTree>
+    <p:extLst>
+      <p:ext uri="{BB962C8B-B14F-4D97-AF65-F5344CB8AC3E}">
+        <p14:creationId xmlns:p14="http://schemas.microsoft.com/office/powerpoint/2010/main" val="4197191302"/>
+      </p:ext>
+    </p:extLst>
+  </p:cSld>
+  <p:clrMapOvr>
+    <a:overrideClrMapping bg1="dk1" tx1="lt1" bg2="dk2" tx2="lt2" accent1="accent1" accent2="accent2" accent3="accent3" accent4="accent4" accent5="accent5" accent6="accent6" hlink="hlink" folHlink="folHlink"/>
+  </p:clrMapOvr>
+</p:sld>
+</file>
+
+<file path=ppt/slides/slide16.xml><?xml version="1.0" encoding="utf-8"?>
+<p:sld xmlns:a="http://schemas.openxmlformats.org/drawingml/2006/main" xmlns:r="http://schemas.openxmlformats.org/officeDocument/2006/relationships" xmlns:p="http://schemas.openxmlformats.org/presentationml/2006/main">
+  <p:cSld>
     <p:spTree>
       <p:nvGrpSpPr>
         <p:cNvPr id="1" name=""/>
@@ -6191,7 +6473,7 @@
 </p:sld>
 </file>
 
-<file path=ppt/slides/slide16.xml><?xml version="1.0" encoding="utf-8"?>
+<file path=ppt/slides/slide17.xml><?xml version="1.0" encoding="utf-8"?>
 <p:sld xmlns:a="http://schemas.openxmlformats.org/drawingml/2006/main" xmlns:r="http://schemas.openxmlformats.org/officeDocument/2006/relationships" xmlns:p="http://schemas.openxmlformats.org/presentationml/2006/main" showMasterSp="0">
   <p:cSld>
     <p:bg>
@@ -9225,7 +9507,7 @@
 </p:sld>
 </file>
 
-<file path=ppt/slides/slide17.xml><?xml version="1.0" encoding="utf-8"?>
+<file path=ppt/slides/slide18.xml><?xml version="1.0" encoding="utf-8"?>
 <p:sld xmlns:a="http://schemas.openxmlformats.org/drawingml/2006/main" xmlns:r="http://schemas.openxmlformats.org/officeDocument/2006/relationships" xmlns:p="http://schemas.openxmlformats.org/presentationml/2006/main">
   <p:cSld>
     <p:spTree>
@@ -10063,7 +10345,7 @@
 </p:sld>
 </file>
 
-<file path=ppt/slides/slide18.xml><?xml version="1.0" encoding="utf-8"?>
+<file path=ppt/slides/slide19.xml><?xml version="1.0" encoding="utf-8"?>
 <p:sld xmlns:a="http://schemas.openxmlformats.org/drawingml/2006/main" xmlns:r="http://schemas.openxmlformats.org/officeDocument/2006/relationships" xmlns:p="http://schemas.openxmlformats.org/presentationml/2006/main">
   <p:cSld>
     <p:spTree>

</xml_diff>